<commit_message>
ajouter references a compte rendu
</commit_message>
<xml_diff>
--- a/docs/service-social/schéma-navigation-service-social/images/Shema-navigation-service-social.pptx
+++ b/docs/service-social/schéma-navigation-service-social/images/Shema-navigation-service-social.pptx
@@ -714,7 +714,7 @@
       </p:grpSpPr>
       <p:sp>
         <p:nvSpPr>
-          <p:cNvPr id="51" name="Google Shape;51;g2b75e48913c_0_0:notes"/>
+          <p:cNvPr id="51" name="Google Shape;51;g2b7ba355125_1_75:notes"/>
           <p:cNvSpPr/>
           <p:nvPr>
             <p:ph idx="2" type="sldImg"/>
@@ -749,7 +749,7 @@
       </p:sp>
       <p:sp>
         <p:nvSpPr>
-          <p:cNvPr id="52" name="Google Shape;52;g2b75e48913c_0_0:notes"/>
+          <p:cNvPr id="52" name="Google Shape;52;g2b7ba355125_1_75:notes"/>
           <p:cNvSpPr txBox="1"/>
           <p:nvPr>
             <p:ph idx="1" type="body"/>
@@ -5468,8 +5468,8 @@
         </p:nvSpPr>
         <p:spPr>
           <a:xfrm>
-            <a:off x="3595888" y="95525"/>
-            <a:ext cx="1718700" cy="469500"/>
+            <a:off x="6032348" y="820058"/>
+            <a:ext cx="1788000" cy="539700"/>
           </a:xfrm>
           <a:prstGeom prst="rect">
             <a:avLst/>
@@ -5501,15 +5501,15 @@
               <a:buNone/>
             </a:pPr>
             <a:r>
-              <a:rPr b="1" lang="fr" sz="1500">
+              <a:rPr b="1" lang="fr">
                 <a:latin typeface="Roboto"/>
                 <a:ea typeface="Roboto"/>
                 <a:cs typeface="Roboto"/>
                 <a:sym typeface="Roboto"/>
               </a:rPr>
-              <a:t>accueil</a:t>
+              <a:t>SelectTuteur</a:t>
             </a:r>
-            <a:endParaRPr b="1" sz="1500">
+            <a:endParaRPr b="1" sz="1200">
               <a:latin typeface="Roboto"/>
               <a:ea typeface="Roboto"/>
               <a:cs typeface="Roboto"/>
@@ -5527,15 +5527,15 @@
               <a:buNone/>
             </a:pPr>
             <a:r>
-              <a:rPr lang="fr" sz="1500">
+              <a:rPr lang="fr" sz="1000">
                 <a:latin typeface="Roboto"/>
                 <a:ea typeface="Roboto"/>
                 <a:cs typeface="Roboto"/>
                 <a:sym typeface="Roboto"/>
               </a:rPr>
-              <a:t>/</a:t>
+              <a:t>/pôle-social/entretien-social/tuteur/selected</a:t>
             </a:r>
-            <a:endParaRPr sz="1500">
+            <a:endParaRPr sz="1300">
               <a:latin typeface="Roboto"/>
               <a:ea typeface="Roboto"/>
               <a:cs typeface="Roboto"/>
@@ -5552,7 +5552,268 @@
         </p:nvSpPr>
         <p:spPr>
           <a:xfrm>
-            <a:off x="3337751" y="911766"/>
+            <a:off x="1086749" y="820058"/>
+            <a:ext cx="1788000" cy="539700"/>
+          </a:xfrm>
+          <a:prstGeom prst="rect">
+            <a:avLst/>
+          </a:prstGeom>
+          <a:noFill/>
+          <a:ln cap="flat" cmpd="sng" w="9525">
+            <a:solidFill>
+              <a:srgbClr val="595959"/>
+            </a:solidFill>
+            <a:prstDash val="solid"/>
+            <a:round/>
+            <a:headEnd len="sm" w="sm" type="none"/>
+            <a:tailEnd len="sm" w="sm" type="none"/>
+          </a:ln>
+        </p:spPr>
+        <p:txBody>
+          <a:bodyPr anchorCtr="0" anchor="ctr" bIns="91425" lIns="91425" spcFirstLastPara="1" rIns="91425" wrap="square" tIns="91425">
+            <a:noAutofit/>
+          </a:bodyPr>
+          <a:lstStyle/>
+          <a:p>
+            <a:pPr indent="0" lvl="0" marL="0" rtl="0" algn="ctr">
+              <a:spcBef>
+                <a:spcPts val="0"/>
+              </a:spcBef>
+              <a:spcAft>
+                <a:spcPts val="0"/>
+              </a:spcAft>
+              <a:buNone/>
+            </a:pPr>
+            <a:r>
+              <a:rPr b="1" lang="fr" sz="1200">
+                <a:latin typeface="Roboto"/>
+                <a:ea typeface="Roboto"/>
+                <a:cs typeface="Roboto"/>
+                <a:sym typeface="Roboto"/>
+              </a:rPr>
+              <a:t>FormAjouteTuteur</a:t>
+            </a:r>
+            <a:endParaRPr b="1" sz="1200">
+              <a:solidFill>
+                <a:srgbClr val="000000"/>
+              </a:solidFill>
+              <a:latin typeface="Roboto"/>
+              <a:ea typeface="Roboto"/>
+              <a:cs typeface="Roboto"/>
+              <a:sym typeface="Roboto"/>
+            </a:endParaRPr>
+          </a:p>
+          <a:p>
+            <a:pPr indent="0" lvl="0" marL="0" rtl="0" algn="ctr">
+              <a:spcBef>
+                <a:spcPts val="0"/>
+              </a:spcBef>
+              <a:spcAft>
+                <a:spcPts val="0"/>
+              </a:spcAft>
+              <a:buNone/>
+            </a:pPr>
+            <a:r>
+              <a:rPr lang="fr" sz="1000">
+                <a:latin typeface="Roboto"/>
+                <a:ea typeface="Roboto"/>
+                <a:cs typeface="Roboto"/>
+                <a:sym typeface="Roboto"/>
+              </a:rPr>
+              <a:t>/pôle-social/entretien-social/tuteur/ajouter</a:t>
+            </a:r>
+            <a:endParaRPr sz="1300">
+              <a:latin typeface="Roboto"/>
+              <a:ea typeface="Roboto"/>
+              <a:cs typeface="Roboto"/>
+              <a:sym typeface="Roboto"/>
+            </a:endParaRPr>
+          </a:p>
+        </p:txBody>
+      </p:sp>
+      <p:sp>
+        <p:nvSpPr>
+          <p:cNvPr id="56" name="Google Shape;56;p13"/>
+          <p:cNvSpPr/>
+          <p:nvPr/>
+        </p:nvSpPr>
+        <p:spPr>
+          <a:xfrm>
+            <a:off x="782362" y="1932587"/>
+            <a:ext cx="2023200" cy="539700"/>
+          </a:xfrm>
+          <a:prstGeom prst="rect">
+            <a:avLst/>
+          </a:prstGeom>
+          <a:noFill/>
+          <a:ln cap="flat" cmpd="sng" w="9525">
+            <a:solidFill>
+              <a:srgbClr val="595959"/>
+            </a:solidFill>
+            <a:prstDash val="solid"/>
+            <a:round/>
+            <a:headEnd len="sm" w="sm" type="none"/>
+            <a:tailEnd len="sm" w="sm" type="none"/>
+          </a:ln>
+        </p:spPr>
+        <p:txBody>
+          <a:bodyPr anchorCtr="0" anchor="ctr" bIns="91425" lIns="91425" spcFirstLastPara="1" rIns="91425" wrap="square" tIns="91425">
+            <a:noAutofit/>
+          </a:bodyPr>
+          <a:lstStyle/>
+          <a:p>
+            <a:pPr indent="0" lvl="0" marL="0" rtl="0" algn="ctr">
+              <a:spcBef>
+                <a:spcPts val="0"/>
+              </a:spcBef>
+              <a:spcAft>
+                <a:spcPts val="0"/>
+              </a:spcAft>
+              <a:buNone/>
+            </a:pPr>
+            <a:r>
+              <a:rPr b="1" lang="fr" sz="1200">
+                <a:latin typeface="Roboto"/>
+                <a:ea typeface="Roboto"/>
+                <a:cs typeface="Roboto"/>
+                <a:sym typeface="Roboto"/>
+              </a:rPr>
+              <a:t>AjouteTuteur</a:t>
+            </a:r>
+            <a:endParaRPr b="1" sz="1200">
+              <a:solidFill>
+                <a:srgbClr val="000000"/>
+              </a:solidFill>
+              <a:latin typeface="Roboto"/>
+              <a:ea typeface="Roboto"/>
+              <a:cs typeface="Roboto"/>
+              <a:sym typeface="Roboto"/>
+            </a:endParaRPr>
+          </a:p>
+          <a:p>
+            <a:pPr indent="0" lvl="0" marL="0" rtl="0" algn="ctr">
+              <a:spcBef>
+                <a:spcPts val="0"/>
+              </a:spcBef>
+              <a:spcAft>
+                <a:spcPts val="0"/>
+              </a:spcAft>
+              <a:buNone/>
+            </a:pPr>
+            <a:r>
+              <a:rPr lang="fr" sz="1000">
+                <a:latin typeface="Roboto"/>
+                <a:ea typeface="Roboto"/>
+                <a:cs typeface="Roboto"/>
+                <a:sym typeface="Roboto"/>
+              </a:rPr>
+              <a:t>/pôle-social/entretien-social/tuteur/ajouter</a:t>
+            </a:r>
+            <a:endParaRPr sz="1300">
+              <a:latin typeface="Roboto"/>
+              <a:ea typeface="Roboto"/>
+              <a:cs typeface="Roboto"/>
+              <a:sym typeface="Roboto"/>
+            </a:endParaRPr>
+          </a:p>
+        </p:txBody>
+      </p:sp>
+      <p:sp>
+        <p:nvSpPr>
+          <p:cNvPr id="57" name="Google Shape;57;p13"/>
+          <p:cNvSpPr/>
+          <p:nvPr/>
+        </p:nvSpPr>
+        <p:spPr>
+          <a:xfrm>
+            <a:off x="6293049" y="3426255"/>
+            <a:ext cx="2308500" cy="539700"/>
+          </a:xfrm>
+          <a:prstGeom prst="rect">
+            <a:avLst/>
+          </a:prstGeom>
+          <a:noFill/>
+          <a:ln cap="flat" cmpd="sng" w="9525">
+            <a:solidFill>
+              <a:srgbClr val="595959"/>
+            </a:solidFill>
+            <a:prstDash val="solid"/>
+            <a:round/>
+            <a:headEnd len="sm" w="sm" type="none"/>
+            <a:tailEnd len="sm" w="sm" type="none"/>
+          </a:ln>
+        </p:spPr>
+        <p:txBody>
+          <a:bodyPr anchorCtr="0" anchor="ctr" bIns="91425" lIns="91425" spcFirstLastPara="1" rIns="91425" wrap="square" tIns="91425">
+            <a:noAutofit/>
+          </a:bodyPr>
+          <a:lstStyle/>
+          <a:p>
+            <a:pPr indent="0" lvl="0" marL="0" rtl="0" algn="ctr">
+              <a:spcBef>
+                <a:spcPts val="0"/>
+              </a:spcBef>
+              <a:spcAft>
+                <a:spcPts val="0"/>
+              </a:spcAft>
+              <a:buNone/>
+            </a:pPr>
+            <a:r>
+              <a:rPr b="1" lang="fr" sz="1200">
+                <a:latin typeface="Roboto"/>
+                <a:ea typeface="Roboto"/>
+                <a:cs typeface="Roboto"/>
+                <a:sym typeface="Roboto"/>
+              </a:rPr>
+              <a:t>SelectPatient</a:t>
+            </a:r>
+            <a:endParaRPr b="1" sz="1200">
+              <a:solidFill>
+                <a:srgbClr val="000000"/>
+              </a:solidFill>
+              <a:latin typeface="Roboto"/>
+              <a:ea typeface="Roboto"/>
+              <a:cs typeface="Roboto"/>
+              <a:sym typeface="Roboto"/>
+            </a:endParaRPr>
+          </a:p>
+          <a:p>
+            <a:pPr indent="0" lvl="0" marL="0" rtl="0" algn="ctr">
+              <a:spcBef>
+                <a:spcPts val="0"/>
+              </a:spcBef>
+              <a:spcAft>
+                <a:spcPts val="0"/>
+              </a:spcAft>
+              <a:buNone/>
+            </a:pPr>
+            <a:r>
+              <a:rPr lang="fr" sz="1000">
+                <a:latin typeface="Roboto"/>
+                <a:ea typeface="Roboto"/>
+                <a:cs typeface="Roboto"/>
+                <a:sym typeface="Roboto"/>
+              </a:rPr>
+              <a:t>/pôle-social/entretien-social/bénéficiaire/selected</a:t>
+            </a:r>
+            <a:endParaRPr sz="1300">
+              <a:latin typeface="Roboto"/>
+              <a:ea typeface="Roboto"/>
+              <a:cs typeface="Roboto"/>
+              <a:sym typeface="Roboto"/>
+            </a:endParaRPr>
+          </a:p>
+        </p:txBody>
+      </p:sp>
+      <p:sp>
+        <p:nvSpPr>
+          <p:cNvPr id="58" name="Google Shape;58;p13"/>
+          <p:cNvSpPr/>
+          <p:nvPr/>
+        </p:nvSpPr>
+        <p:spPr>
+          <a:xfrm>
+            <a:off x="587625" y="2920248"/>
             <a:ext cx="2398800" cy="539700"/>
           </a:xfrm>
           <a:prstGeom prst="rect">
@@ -5585,15 +5846,18 @@
               <a:buNone/>
             </a:pPr>
             <a:r>
-              <a:rPr b="1" lang="fr">
+              <a:rPr b="1" lang="fr" sz="1200">
                 <a:latin typeface="Roboto"/>
                 <a:ea typeface="Roboto"/>
                 <a:cs typeface="Roboto"/>
                 <a:sym typeface="Roboto"/>
               </a:rPr>
-              <a:t>Dossiers bénéficiaires</a:t>
+              <a:t>FormAjoutePatient</a:t>
             </a:r>
-            <a:endParaRPr b="1">
+            <a:endParaRPr b="1" sz="1200">
+              <a:solidFill>
+                <a:srgbClr val="000000"/>
+              </a:solidFill>
               <a:latin typeface="Roboto"/>
               <a:ea typeface="Roboto"/>
               <a:cs typeface="Roboto"/>
@@ -5617,9 +5881,9 @@
                 <a:cs typeface="Roboto"/>
                 <a:sym typeface="Roboto"/>
               </a:rPr>
-              <a:t>/pôle-social/entretien-social</a:t>
+              <a:t>/pôle-social/entretien-social/tuteur/{tuteurID}/bénéficiaire/ajouter</a:t>
             </a:r>
-            <a:endParaRPr sz="1000">
+            <a:endParaRPr sz="1300">
               <a:latin typeface="Roboto"/>
               <a:ea typeface="Roboto"/>
               <a:cs typeface="Roboto"/>
@@ -5630,14 +5894,14 @@
       </p:sp>
       <p:sp>
         <p:nvSpPr>
-          <p:cNvPr id="56" name="Google Shape;56;p13"/>
+          <p:cNvPr id="59" name="Google Shape;59;p13"/>
           <p:cNvSpPr/>
           <p:nvPr/>
         </p:nvSpPr>
         <p:spPr>
           <a:xfrm>
-            <a:off x="6032348" y="2496458"/>
-            <a:ext cx="1788000" cy="539700"/>
+            <a:off x="3337751" y="161753"/>
+            <a:ext cx="2398800" cy="539700"/>
           </a:xfrm>
           <a:prstGeom prst="rect">
             <a:avLst/>
@@ -5669,21 +5933,15 @@
               <a:buNone/>
             </a:pPr>
             <a:r>
-              <a:rPr b="1" lang="fr" sz="1200">
-                <a:solidFill>
-                  <a:schemeClr val="dk1"/>
-                </a:solidFill>
+              <a:rPr b="1" lang="fr">
                 <a:latin typeface="Roboto"/>
                 <a:ea typeface="Roboto"/>
                 <a:cs typeface="Roboto"/>
                 <a:sym typeface="Roboto"/>
               </a:rPr>
-              <a:t>select tuteur</a:t>
+              <a:t>FormSelectTuteur</a:t>
             </a:r>
             <a:endParaRPr b="1" sz="1200">
-              <a:solidFill>
-                <a:schemeClr val="dk1"/>
-              </a:solidFill>
               <a:latin typeface="Roboto"/>
               <a:ea typeface="Roboto"/>
               <a:cs typeface="Roboto"/>
@@ -5702,9 +5960,6 @@
             </a:pPr>
             <a:r>
               <a:rPr lang="fr" sz="1000">
-                <a:solidFill>
-                  <a:schemeClr val="dk1"/>
-                </a:solidFill>
                 <a:latin typeface="Roboto"/>
                 <a:ea typeface="Roboto"/>
                 <a:cs typeface="Roboto"/>
@@ -5721,16 +5976,184 @@
           </a:p>
         </p:txBody>
       </p:sp>
+      <p:cxnSp>
+        <p:nvCxnSpPr>
+          <p:cNvPr id="60" name="Google Shape;60;p13"/>
+          <p:cNvCxnSpPr>
+            <a:stCxn id="55" idx="1"/>
+            <a:endCxn id="56" idx="1"/>
+          </p:cNvCxnSpPr>
+          <p:nvPr/>
+        </p:nvCxnSpPr>
+        <p:spPr>
+          <a:xfrm flipH="1">
+            <a:off x="782249" y="1089908"/>
+            <a:ext cx="304500" cy="1112400"/>
+          </a:xfrm>
+          <a:prstGeom prst="bentConnector3">
+            <a:avLst>
+              <a:gd fmla="val 178165" name="adj1"/>
+            </a:avLst>
+          </a:prstGeom>
+          <a:noFill/>
+          <a:ln cap="flat" cmpd="sng" w="9525">
+            <a:solidFill>
+              <a:srgbClr val="595959"/>
+            </a:solidFill>
+            <a:prstDash val="solid"/>
+            <a:round/>
+            <a:headEnd len="med" w="med" type="none"/>
+            <a:tailEnd len="med" w="med" type="triangle"/>
+          </a:ln>
+        </p:spPr>
+      </p:cxnSp>
+      <p:cxnSp>
+        <p:nvCxnSpPr>
+          <p:cNvPr id="61" name="Google Shape;61;p13"/>
+          <p:cNvCxnSpPr>
+            <a:stCxn id="59" idx="2"/>
+            <a:endCxn id="55" idx="3"/>
+          </p:cNvCxnSpPr>
+          <p:nvPr/>
+        </p:nvCxnSpPr>
+        <p:spPr>
+          <a:xfrm rot="5400000">
+            <a:off x="3511751" y="64553"/>
+            <a:ext cx="388500" cy="1662300"/>
+          </a:xfrm>
+          <a:prstGeom prst="bentConnector2">
+            <a:avLst/>
+          </a:prstGeom>
+          <a:noFill/>
+          <a:ln cap="flat" cmpd="sng" w="9525">
+            <a:solidFill>
+              <a:srgbClr val="595959"/>
+            </a:solidFill>
+            <a:prstDash val="solid"/>
+            <a:round/>
+            <a:headEnd len="med" w="med" type="none"/>
+            <a:tailEnd len="med" w="med" type="triangle"/>
+          </a:ln>
+        </p:spPr>
+      </p:cxnSp>
+      <p:cxnSp>
+        <p:nvCxnSpPr>
+          <p:cNvPr id="62" name="Google Shape;62;p13"/>
+          <p:cNvCxnSpPr>
+            <a:stCxn id="59" idx="2"/>
+            <a:endCxn id="54" idx="1"/>
+          </p:cNvCxnSpPr>
+          <p:nvPr/>
+        </p:nvCxnSpPr>
+        <p:spPr>
+          <a:xfrm flipH="1" rot="-5400000">
+            <a:off x="5090501" y="148103"/>
+            <a:ext cx="388500" cy="1495200"/>
+          </a:xfrm>
+          <a:prstGeom prst="bentConnector2">
+            <a:avLst/>
+          </a:prstGeom>
+          <a:noFill/>
+          <a:ln cap="flat" cmpd="sng" w="9525">
+            <a:solidFill>
+              <a:srgbClr val="595959"/>
+            </a:solidFill>
+            <a:prstDash val="solid"/>
+            <a:round/>
+            <a:headEnd len="med" w="med" type="none"/>
+            <a:tailEnd len="med" w="med" type="triangle"/>
+          </a:ln>
+        </p:spPr>
+      </p:cxnSp>
+      <p:cxnSp>
+        <p:nvCxnSpPr>
+          <p:cNvPr id="63" name="Google Shape;63;p13"/>
+          <p:cNvCxnSpPr>
+            <a:stCxn id="64" idx="2"/>
+            <a:endCxn id="58" idx="3"/>
+          </p:cNvCxnSpPr>
+          <p:nvPr/>
+        </p:nvCxnSpPr>
+        <p:spPr>
+          <a:xfrm rot="5400000">
+            <a:off x="4568946" y="889625"/>
+            <a:ext cx="717900" cy="3883200"/>
+          </a:xfrm>
+          <a:prstGeom prst="bentConnector2">
+            <a:avLst/>
+          </a:prstGeom>
+          <a:noFill/>
+          <a:ln cap="flat" cmpd="sng" w="9525">
+            <a:solidFill>
+              <a:srgbClr val="595959"/>
+            </a:solidFill>
+            <a:prstDash val="solid"/>
+            <a:round/>
+            <a:headEnd len="med" w="med" type="none"/>
+            <a:tailEnd len="med" w="med" type="triangle"/>
+          </a:ln>
+        </p:spPr>
+      </p:cxnSp>
       <p:sp>
         <p:nvSpPr>
-          <p:cNvPr id="57" name="Google Shape;57;p13"/>
+          <p:cNvPr id="65" name="Google Shape;65;p13"/>
+          <p:cNvSpPr txBox="1"/>
+          <p:nvPr/>
+        </p:nvSpPr>
+        <p:spPr>
+          <a:xfrm>
+            <a:off x="7658578" y="1404185"/>
+            <a:ext cx="1044900" cy="369300"/>
+          </a:xfrm>
+          <a:prstGeom prst="rect">
+            <a:avLst/>
+          </a:prstGeom>
+          <a:noFill/>
+          <a:ln>
+            <a:noFill/>
+          </a:ln>
+        </p:spPr>
+        <p:txBody>
+          <a:bodyPr anchorCtr="0" anchor="t" bIns="91425" lIns="91425" spcFirstLastPara="1" rIns="91425" wrap="square" tIns="91425">
+            <a:spAutoFit/>
+          </a:bodyPr>
+          <a:lstStyle/>
+          <a:p>
+            <a:pPr indent="0" lvl="0" marL="0" rtl="0" algn="l">
+              <a:spcBef>
+                <a:spcPts val="0"/>
+              </a:spcBef>
+              <a:spcAft>
+                <a:spcPts val="0"/>
+              </a:spcAft>
+              <a:buNone/>
+            </a:pPr>
+            <a:r>
+              <a:rPr lang="fr" sz="1200">
+                <a:solidFill>
+                  <a:srgbClr val="595959"/>
+                </a:solidFill>
+              </a:rPr>
+              <a:t>{tuteur_id}</a:t>
+            </a:r>
+            <a:endParaRPr sz="1200">
+              <a:solidFill>
+                <a:srgbClr val="595959"/>
+              </a:solidFill>
+            </a:endParaRPr>
+          </a:p>
+        </p:txBody>
+      </p:sp>
+      <p:sp>
+        <p:nvSpPr>
+          <p:cNvPr id="64" name="Google Shape;64;p13"/>
           <p:cNvSpPr/>
           <p:nvPr/>
         </p:nvSpPr>
         <p:spPr>
           <a:xfrm>
-            <a:off x="1086749" y="2496458"/>
-            <a:ext cx="1788000" cy="539700"/>
+            <a:off x="5506746" y="1932575"/>
+            <a:ext cx="2725500" cy="539700"/>
           </a:xfrm>
           <a:prstGeom prst="rect">
             <a:avLst/>
@@ -5762,21 +6185,15 @@
               <a:buNone/>
             </a:pPr>
             <a:r>
-              <a:rPr b="1" lang="fr" sz="1200">
-                <a:solidFill>
-                  <a:schemeClr val="dk1"/>
-                </a:solidFill>
+              <a:rPr b="1" lang="fr">
                 <a:latin typeface="Roboto"/>
                 <a:ea typeface="Roboto"/>
                 <a:cs typeface="Roboto"/>
                 <a:sym typeface="Roboto"/>
               </a:rPr>
-              <a:t>Ajouter tuteur</a:t>
+              <a:t>FormSelectPatient</a:t>
             </a:r>
             <a:endParaRPr b="1" sz="1200">
-              <a:solidFill>
-                <a:schemeClr val="dk1"/>
-              </a:solidFill>
               <a:latin typeface="Roboto"/>
               <a:ea typeface="Roboto"/>
               <a:cs typeface="Roboto"/>
@@ -5795,15 +6212,12 @@
             </a:pPr>
             <a:r>
               <a:rPr lang="fr" sz="1000">
-                <a:solidFill>
-                  <a:schemeClr val="dk1"/>
-                </a:solidFill>
                 <a:latin typeface="Roboto"/>
                 <a:ea typeface="Roboto"/>
                 <a:cs typeface="Roboto"/>
                 <a:sym typeface="Roboto"/>
               </a:rPr>
-              <a:t>/pôle-social/entretien-social/choix/tuteur</a:t>
+              <a:t>/pôle-social/entretien-social/tuteur/{tuteur_id}/bénéficiaire</a:t>
             </a:r>
             <a:endParaRPr sz="1300">
               <a:latin typeface="Roboto"/>
@@ -5816,36 +6230,30 @@
       </p:sp>
       <p:sp>
         <p:nvSpPr>
-          <p:cNvPr id="58" name="Google Shape;58;p13"/>
-          <p:cNvSpPr/>
+          <p:cNvPr id="66" name="Google Shape;66;p13"/>
+          <p:cNvSpPr txBox="1"/>
           <p:nvPr/>
         </p:nvSpPr>
         <p:spPr>
           <a:xfrm>
-            <a:off x="3525562" y="3227987"/>
-            <a:ext cx="2023200" cy="539700"/>
+            <a:off x="4269613" y="2865170"/>
+            <a:ext cx="1044900" cy="369300"/>
           </a:xfrm>
           <a:prstGeom prst="rect">
             <a:avLst/>
           </a:prstGeom>
           <a:noFill/>
-          <a:ln cap="flat" cmpd="sng" w="9525">
-            <a:solidFill>
-              <a:srgbClr val="595959"/>
-            </a:solidFill>
-            <a:prstDash val="solid"/>
-            <a:round/>
-            <a:headEnd len="sm" w="sm" type="none"/>
-            <a:tailEnd len="sm" w="sm" type="none"/>
+          <a:ln>
+            <a:noFill/>
           </a:ln>
         </p:spPr>
         <p:txBody>
-          <a:bodyPr anchorCtr="0" anchor="ctr" bIns="91425" lIns="91425" spcFirstLastPara="1" rIns="91425" wrap="square" tIns="91425">
-            <a:noAutofit/>
+          <a:bodyPr anchorCtr="0" anchor="t" bIns="91425" lIns="91425" spcFirstLastPara="1" rIns="91425" wrap="square" tIns="91425">
+            <a:spAutoFit/>
           </a:bodyPr>
           <a:lstStyle/>
           <a:p>
-            <a:pPr indent="0" lvl="0" marL="0" rtl="0" algn="ctr">
+            <a:pPr indent="0" lvl="0" marL="0" rtl="0" algn="l">
               <a:spcBef>
                 <a:spcPts val="0"/>
               </a:spcBef>
@@ -5855,67 +6263,30 @@
               <a:buNone/>
             </a:pPr>
             <a:r>
-              <a:rPr b="1" lang="fr" sz="1200">
+              <a:rPr lang="fr" sz="1200">
                 <a:solidFill>
-                  <a:schemeClr val="dk1"/>
+                  <a:srgbClr val="595959"/>
                 </a:solidFill>
-                <a:latin typeface="Roboto"/>
-                <a:ea typeface="Roboto"/>
-                <a:cs typeface="Roboto"/>
-                <a:sym typeface="Roboto"/>
               </a:rPr>
-              <a:t>select bénéficiaires</a:t>
+              <a:t>{tuteurID}</a:t>
             </a:r>
-            <a:endParaRPr b="1" sz="1200">
+            <a:endParaRPr sz="1200">
               <a:solidFill>
-                <a:schemeClr val="dk1"/>
+                <a:srgbClr val="595959"/>
               </a:solidFill>
-              <a:latin typeface="Roboto"/>
-              <a:ea typeface="Roboto"/>
-              <a:cs typeface="Roboto"/>
-              <a:sym typeface="Roboto"/>
-            </a:endParaRPr>
-          </a:p>
-          <a:p>
-            <a:pPr indent="0" lvl="0" marL="0" rtl="0" algn="ctr">
-              <a:spcBef>
-                <a:spcPts val="0"/>
-              </a:spcBef>
-              <a:spcAft>
-                <a:spcPts val="0"/>
-              </a:spcAft>
-              <a:buNone/>
-            </a:pPr>
-            <a:r>
-              <a:rPr lang="fr" sz="1000">
-                <a:solidFill>
-                  <a:schemeClr val="dk1"/>
-                </a:solidFill>
-                <a:latin typeface="Roboto"/>
-                <a:ea typeface="Roboto"/>
-                <a:cs typeface="Roboto"/>
-                <a:sym typeface="Roboto"/>
-              </a:rPr>
-              <a:t>/pôle-social/entretien-social/tuteur/{id-tuteur}/bénéficiaire</a:t>
-            </a:r>
-            <a:endParaRPr sz="1300">
-              <a:latin typeface="Roboto"/>
-              <a:ea typeface="Roboto"/>
-              <a:cs typeface="Roboto"/>
-              <a:sym typeface="Roboto"/>
             </a:endParaRPr>
           </a:p>
         </p:txBody>
       </p:sp>
       <p:sp>
         <p:nvSpPr>
-          <p:cNvPr id="59" name="Google Shape;59;p13"/>
+          <p:cNvPr id="67" name="Google Shape;67;p13"/>
           <p:cNvSpPr/>
           <p:nvPr/>
         </p:nvSpPr>
         <p:spPr>
           <a:xfrm>
-            <a:off x="6251074" y="4075767"/>
+            <a:off x="629949" y="3811867"/>
             <a:ext cx="2308500" cy="539700"/>
           </a:xfrm>
           <a:prstGeom prst="rect">
@@ -5949,19 +6320,16 @@
             </a:pPr>
             <a:r>
               <a:rPr b="1" lang="fr" sz="1200">
-                <a:solidFill>
-                  <a:schemeClr val="dk1"/>
-                </a:solidFill>
                 <a:latin typeface="Roboto"/>
                 <a:ea typeface="Roboto"/>
                 <a:cs typeface="Roboto"/>
                 <a:sym typeface="Roboto"/>
               </a:rPr>
-              <a:t>Ajouter un bénéficiaires</a:t>
+              <a:t>AjoutePatient</a:t>
             </a:r>
             <a:endParaRPr b="1" sz="1200">
               <a:solidFill>
-                <a:schemeClr val="dk1"/>
+                <a:srgbClr val="000000"/>
               </a:solidFill>
               <a:latin typeface="Roboto"/>
               <a:ea typeface="Roboto"/>
@@ -5981,15 +6349,12 @@
             </a:pPr>
             <a:r>
               <a:rPr lang="fr" sz="1000">
-                <a:solidFill>
-                  <a:schemeClr val="dk1"/>
-                </a:solidFill>
                 <a:latin typeface="Roboto"/>
                 <a:ea typeface="Roboto"/>
                 <a:cs typeface="Roboto"/>
                 <a:sym typeface="Roboto"/>
               </a:rPr>
-              <a:t>/pôle-social/entretien-social/tuteur/{id-tuteur}/bénéficiaire/ajouter</a:t>
+              <a:t>/pôle-social/entretien-social/bénéficiaire/ajouter</a:t>
             </a:r>
             <a:endParaRPr sz="1300">
               <a:latin typeface="Roboto"/>
@@ -6002,14 +6367,14 @@
       </p:sp>
       <p:sp>
         <p:nvSpPr>
-          <p:cNvPr id="60" name="Google Shape;60;p13"/>
+          <p:cNvPr id="68" name="Google Shape;68;p13"/>
           <p:cNvSpPr/>
           <p:nvPr/>
         </p:nvSpPr>
         <p:spPr>
           <a:xfrm>
-            <a:off x="511425" y="4063248"/>
-            <a:ext cx="2398800" cy="539700"/>
+            <a:off x="3220749" y="4497667"/>
+            <a:ext cx="2308500" cy="539700"/>
           </a:xfrm>
           <a:prstGeom prst="rect">
             <a:avLst/>
@@ -6042,19 +6407,16 @@
             </a:pPr>
             <a:r>
               <a:rPr b="1" lang="fr" sz="1200">
-                <a:solidFill>
-                  <a:schemeClr val="dk1"/>
-                </a:solidFill>
                 <a:latin typeface="Roboto"/>
                 <a:ea typeface="Roboto"/>
                 <a:cs typeface="Roboto"/>
                 <a:sym typeface="Roboto"/>
               </a:rPr>
-              <a:t>enquête</a:t>
+              <a:t>FormEntretienSocial</a:t>
             </a:r>
             <a:endParaRPr b="1" sz="1200">
               <a:solidFill>
-                <a:schemeClr val="dk1"/>
+                <a:srgbClr val="000000"/>
               </a:solidFill>
               <a:latin typeface="Roboto"/>
               <a:ea typeface="Roboto"/>
@@ -6074,15 +6436,12 @@
             </a:pPr>
             <a:r>
               <a:rPr lang="fr" sz="1000">
-                <a:solidFill>
-                  <a:schemeClr val="dk1"/>
-                </a:solidFill>
                 <a:latin typeface="Roboto"/>
                 <a:ea typeface="Roboto"/>
                 <a:cs typeface="Roboto"/>
                 <a:sym typeface="Roboto"/>
               </a:rPr>
-              <a:t>/pôle-social/entretien-social/{id-bénéficier}/enquette</a:t>
+              <a:t>/pôle-social/entretien-social/{bénéficiaireID}/enquette</a:t>
             </a:r>
             <a:endParaRPr sz="1300">
               <a:latin typeface="Roboto"/>
@@ -6095,164 +6454,14 @@
       </p:sp>
       <p:sp>
         <p:nvSpPr>
-          <p:cNvPr id="61" name="Google Shape;61;p13"/>
-          <p:cNvSpPr txBox="1"/>
-          <p:nvPr/>
-        </p:nvSpPr>
-        <p:spPr>
-          <a:xfrm>
-            <a:off x="1980702" y="3156785"/>
-            <a:ext cx="1044900" cy="369300"/>
-          </a:xfrm>
-          <a:prstGeom prst="rect">
-            <a:avLst/>
-          </a:prstGeom>
-          <a:noFill/>
-          <a:ln>
-            <a:noFill/>
-          </a:ln>
-        </p:spPr>
-        <p:txBody>
-          <a:bodyPr anchorCtr="0" anchor="t" bIns="91425" lIns="91425" spcFirstLastPara="1" rIns="91425" wrap="square" tIns="91425">
-            <a:spAutoFit/>
-          </a:bodyPr>
-          <a:lstStyle/>
-          <a:p>
-            <a:pPr indent="0" lvl="0" marL="0" rtl="0" algn="l">
-              <a:spcBef>
-                <a:spcPts val="0"/>
-              </a:spcBef>
-              <a:spcAft>
-                <a:spcPts val="0"/>
-              </a:spcAft>
-              <a:buNone/>
-            </a:pPr>
-            <a:r>
-              <a:rPr lang="fr" sz="1200">
-                <a:solidFill>
-                  <a:schemeClr val="dk2"/>
-                </a:solidFill>
-              </a:rPr>
-              <a:t>{id-tuteur }</a:t>
-            </a:r>
-            <a:endParaRPr sz="1200">
-              <a:solidFill>
-                <a:schemeClr val="dk2"/>
-              </a:solidFill>
-            </a:endParaRPr>
-          </a:p>
-        </p:txBody>
-      </p:sp>
-      <p:sp>
-        <p:nvSpPr>
-          <p:cNvPr id="62" name="Google Shape;62;p13"/>
-          <p:cNvSpPr txBox="1"/>
-          <p:nvPr/>
-        </p:nvSpPr>
-        <p:spPr>
-          <a:xfrm>
-            <a:off x="3047175" y="4002076"/>
-            <a:ext cx="1194600" cy="369300"/>
-          </a:xfrm>
-          <a:prstGeom prst="rect">
-            <a:avLst/>
-          </a:prstGeom>
-          <a:noFill/>
-          <a:ln>
-            <a:noFill/>
-          </a:ln>
-        </p:spPr>
-        <p:txBody>
-          <a:bodyPr anchorCtr="0" anchor="t" bIns="91425" lIns="91425" spcFirstLastPara="1" rIns="91425" wrap="square" tIns="91425">
-            <a:spAutoFit/>
-          </a:bodyPr>
-          <a:lstStyle/>
-          <a:p>
-            <a:pPr indent="0" lvl="0" marL="0" rtl="0" algn="l">
-              <a:spcBef>
-                <a:spcPts val="0"/>
-              </a:spcBef>
-              <a:spcAft>
-                <a:spcPts val="0"/>
-              </a:spcAft>
-              <a:buNone/>
-            </a:pPr>
-            <a:r>
-              <a:rPr lang="fr" sz="1200">
-                <a:solidFill>
-                  <a:schemeClr val="dk2"/>
-                </a:solidFill>
-              </a:rPr>
-              <a:t>{id-bénéficier }</a:t>
-            </a:r>
-            <a:endParaRPr sz="1200">
-              <a:solidFill>
-                <a:schemeClr val="dk2"/>
-              </a:solidFill>
-            </a:endParaRPr>
-          </a:p>
-        </p:txBody>
-      </p:sp>
-      <p:sp>
-        <p:nvSpPr>
-          <p:cNvPr id="63" name="Google Shape;63;p13"/>
-          <p:cNvSpPr txBox="1"/>
-          <p:nvPr/>
-        </p:nvSpPr>
-        <p:spPr>
-          <a:xfrm>
-            <a:off x="3674858" y="4532516"/>
-            <a:ext cx="1194600" cy="369300"/>
-          </a:xfrm>
-          <a:prstGeom prst="rect">
-            <a:avLst/>
-          </a:prstGeom>
-          <a:noFill/>
-          <a:ln>
-            <a:noFill/>
-          </a:ln>
-        </p:spPr>
-        <p:txBody>
-          <a:bodyPr anchorCtr="0" anchor="t" bIns="91425" lIns="91425" spcFirstLastPara="1" rIns="91425" wrap="square" tIns="91425">
-            <a:spAutoFit/>
-          </a:bodyPr>
-          <a:lstStyle/>
-          <a:p>
-            <a:pPr indent="0" lvl="0" marL="0" rtl="0" algn="l">
-              <a:spcBef>
-                <a:spcPts val="0"/>
-              </a:spcBef>
-              <a:spcAft>
-                <a:spcPts val="0"/>
-              </a:spcAft>
-              <a:buNone/>
-            </a:pPr>
-            <a:r>
-              <a:rPr lang="fr" sz="1200">
-                <a:solidFill>
-                  <a:schemeClr val="dk2"/>
-                </a:solidFill>
-              </a:rPr>
-              <a:t>{id-bénéficier }</a:t>
-            </a:r>
-            <a:endParaRPr sz="1200">
-              <a:solidFill>
-                <a:schemeClr val="dk2"/>
-              </a:solidFill>
-            </a:endParaRPr>
-          </a:p>
-        </p:txBody>
-      </p:sp>
-      <p:sp>
-        <p:nvSpPr>
-          <p:cNvPr id="64" name="Google Shape;64;p13"/>
+          <p:cNvPr id="69" name="Google Shape;69;p13"/>
           <p:cNvSpPr/>
           <p:nvPr/>
         </p:nvSpPr>
         <p:spPr>
           <a:xfrm>
-            <a:off x="3337751" y="1685753"/>
-            <a:ext cx="2398800" cy="539700"/>
+            <a:off x="6344949" y="4497667"/>
+            <a:ext cx="2308500" cy="539700"/>
           </a:xfrm>
           <a:prstGeom prst="rect">
             <a:avLst/>
@@ -6285,19 +6494,16 @@
             </a:pPr>
             <a:r>
               <a:rPr b="1" lang="fr" sz="1200">
-                <a:solidFill>
-                  <a:schemeClr val="dk1"/>
-                </a:solidFill>
                 <a:latin typeface="Roboto"/>
                 <a:ea typeface="Roboto"/>
                 <a:cs typeface="Roboto"/>
                 <a:sym typeface="Roboto"/>
               </a:rPr>
-              <a:t>Ajouter dossiers bénéficiaires</a:t>
+              <a:t>AjouterEntretienSocial</a:t>
             </a:r>
             <a:endParaRPr b="1" sz="1200">
               <a:solidFill>
-                <a:schemeClr val="dk1"/>
+                <a:srgbClr val="000000"/>
               </a:solidFill>
               <a:latin typeface="Roboto"/>
               <a:ea typeface="Roboto"/>
@@ -6317,15 +6523,12 @@
             </a:pPr>
             <a:r>
               <a:rPr lang="fr" sz="1000">
-                <a:solidFill>
-                  <a:schemeClr val="dk1"/>
-                </a:solidFill>
                 <a:latin typeface="Roboto"/>
                 <a:ea typeface="Roboto"/>
                 <a:cs typeface="Roboto"/>
                 <a:sym typeface="Roboto"/>
               </a:rPr>
-              <a:t>/pôle-social/entretien-social/choix/tuteur</a:t>
+              <a:t>/pôle-social/entretien-social/bénéficiaire/{patientID}/enquette</a:t>
             </a:r>
             <a:endParaRPr sz="1300">
               <a:latin typeface="Roboto"/>
@@ -6338,16 +6541,17 @@
       </p:sp>
       <p:cxnSp>
         <p:nvCxnSpPr>
-          <p:cNvPr id="65" name="Google Shape;65;p13"/>
+          <p:cNvPr id="70" name="Google Shape;70;p13"/>
           <p:cNvCxnSpPr>
-            <a:endCxn id="55" idx="0"/>
+            <a:stCxn id="68" idx="3"/>
+            <a:endCxn id="69" idx="1"/>
           </p:cNvCxnSpPr>
           <p:nvPr/>
         </p:nvCxnSpPr>
         <p:spPr>
           <a:xfrm>
-            <a:off x="4537151" y="564966"/>
-            <a:ext cx="0" cy="346800"/>
+            <a:off x="5529249" y="4767517"/>
+            <a:ext cx="815700" cy="0"/>
           </a:xfrm>
           <a:prstGeom prst="straightConnector1">
             <a:avLst/>
@@ -6366,17 +6570,17 @@
       </p:cxnSp>
       <p:cxnSp>
         <p:nvCxnSpPr>
-          <p:cNvPr id="66" name="Google Shape;66;p13"/>
+          <p:cNvPr id="71" name="Google Shape;71;p13"/>
           <p:cNvCxnSpPr>
-            <a:stCxn id="55" idx="2"/>
-            <a:endCxn id="64" idx="0"/>
+            <a:stCxn id="56" idx="3"/>
+            <a:endCxn id="64" idx="1"/>
           </p:cNvCxnSpPr>
           <p:nvPr/>
         </p:nvCxnSpPr>
         <p:spPr>
           <a:xfrm>
-            <a:off x="4537151" y="1451466"/>
-            <a:ext cx="0" cy="234300"/>
+            <a:off x="2805562" y="2202437"/>
+            <a:ext cx="2701200" cy="0"/>
           </a:xfrm>
           <a:prstGeom prst="straightConnector1">
             <a:avLst/>
@@ -6395,162 +6599,17 @@
       </p:cxnSp>
       <p:cxnSp>
         <p:nvCxnSpPr>
-          <p:cNvPr id="67" name="Google Shape;67;p13"/>
+          <p:cNvPr id="72" name="Google Shape;72;p13"/>
           <p:cNvCxnSpPr>
-            <a:stCxn id="57" idx="2"/>
-            <a:endCxn id="58" idx="1"/>
+            <a:stCxn id="57" idx="1"/>
+            <a:endCxn id="68" idx="0"/>
           </p:cNvCxnSpPr>
           <p:nvPr/>
         </p:nvCxnSpPr>
         <p:spPr>
-          <a:xfrm flipH="1" rot="-5400000">
-            <a:off x="2522249" y="2494658"/>
-            <a:ext cx="461700" cy="1544700"/>
-          </a:xfrm>
-          <a:prstGeom prst="bentConnector2">
-            <a:avLst/>
-          </a:prstGeom>
-          <a:noFill/>
-          <a:ln cap="flat" cmpd="sng" w="9525">
-            <a:solidFill>
-              <a:schemeClr val="dk2"/>
-            </a:solidFill>
-            <a:prstDash val="solid"/>
-            <a:round/>
-            <a:headEnd len="med" w="med" type="none"/>
-            <a:tailEnd len="med" w="med" type="triangle"/>
-          </a:ln>
-        </p:spPr>
-      </p:cxnSp>
-      <p:cxnSp>
-        <p:nvCxnSpPr>
-          <p:cNvPr id="68" name="Google Shape;68;p13"/>
-          <p:cNvCxnSpPr>
-            <a:stCxn id="56" idx="2"/>
-            <a:endCxn id="58" idx="3"/>
-          </p:cNvCxnSpPr>
-          <p:nvPr/>
-        </p:nvCxnSpPr>
-        <p:spPr>
-          <a:xfrm rot="5400000">
-            <a:off x="6006698" y="2578208"/>
-            <a:ext cx="461700" cy="1377600"/>
-          </a:xfrm>
-          <a:prstGeom prst="bentConnector2">
-            <a:avLst/>
-          </a:prstGeom>
-          <a:noFill/>
-          <a:ln cap="flat" cmpd="sng" w="9525">
-            <a:solidFill>
-              <a:schemeClr val="dk2"/>
-            </a:solidFill>
-            <a:prstDash val="solid"/>
-            <a:round/>
-            <a:headEnd len="med" w="med" type="none"/>
-            <a:tailEnd len="med" w="med" type="triangle"/>
-          </a:ln>
-        </p:spPr>
-      </p:cxnSp>
-      <p:cxnSp>
-        <p:nvCxnSpPr>
-          <p:cNvPr id="69" name="Google Shape;69;p13"/>
-          <p:cNvCxnSpPr>
-            <a:stCxn id="58" idx="2"/>
-            <a:endCxn id="59" idx="1"/>
-          </p:cNvCxnSpPr>
-          <p:nvPr/>
-        </p:nvCxnSpPr>
-        <p:spPr>
-          <a:xfrm flipH="1" rot="-5400000">
-            <a:off x="5105212" y="3199637"/>
-            <a:ext cx="577800" cy="1713900"/>
-          </a:xfrm>
-          <a:prstGeom prst="bentConnector2">
-            <a:avLst/>
-          </a:prstGeom>
-          <a:noFill/>
-          <a:ln cap="flat" cmpd="sng" w="9525">
-            <a:solidFill>
-              <a:schemeClr val="dk2"/>
-            </a:solidFill>
-            <a:prstDash val="solid"/>
-            <a:round/>
-            <a:headEnd len="med" w="med" type="none"/>
-            <a:tailEnd len="med" w="med" type="triangle"/>
-          </a:ln>
-        </p:spPr>
-      </p:cxnSp>
-      <p:cxnSp>
-        <p:nvCxnSpPr>
-          <p:cNvPr id="70" name="Google Shape;70;p13"/>
-          <p:cNvCxnSpPr>
-            <a:stCxn id="64" idx="2"/>
-            <a:endCxn id="57" idx="3"/>
-          </p:cNvCxnSpPr>
-          <p:nvPr/>
-        </p:nvCxnSpPr>
-        <p:spPr>
-          <a:xfrm rot="5400000">
-            <a:off x="3435551" y="1664753"/>
-            <a:ext cx="540900" cy="1662300"/>
-          </a:xfrm>
-          <a:prstGeom prst="bentConnector2">
-            <a:avLst/>
-          </a:prstGeom>
-          <a:noFill/>
-          <a:ln cap="flat" cmpd="sng" w="9525">
-            <a:solidFill>
-              <a:schemeClr val="dk2"/>
-            </a:solidFill>
-            <a:prstDash val="solid"/>
-            <a:round/>
-            <a:headEnd len="med" w="med" type="none"/>
-            <a:tailEnd len="med" w="med" type="triangle"/>
-          </a:ln>
-        </p:spPr>
-      </p:cxnSp>
-      <p:cxnSp>
-        <p:nvCxnSpPr>
-          <p:cNvPr id="71" name="Google Shape;71;p13"/>
-          <p:cNvCxnSpPr>
-            <a:stCxn id="64" idx="2"/>
-            <a:endCxn id="56" idx="1"/>
-          </p:cNvCxnSpPr>
-          <p:nvPr/>
-        </p:nvCxnSpPr>
-        <p:spPr>
-          <a:xfrm flipH="1" rot="-5400000">
-            <a:off x="5014301" y="1748303"/>
-            <a:ext cx="540900" cy="1495200"/>
-          </a:xfrm>
-          <a:prstGeom prst="bentConnector2">
-            <a:avLst/>
-          </a:prstGeom>
-          <a:noFill/>
-          <a:ln cap="flat" cmpd="sng" w="9525">
-            <a:solidFill>
-              <a:schemeClr val="dk2"/>
-            </a:solidFill>
-            <a:prstDash val="solid"/>
-            <a:round/>
-            <a:headEnd len="med" w="med" type="none"/>
-            <a:tailEnd len="med" w="med" type="triangle"/>
-          </a:ln>
-        </p:spPr>
-      </p:cxnSp>
-      <p:cxnSp>
-        <p:nvCxnSpPr>
-          <p:cNvPr id="72" name="Google Shape;72;p13"/>
-          <p:cNvCxnSpPr>
-            <a:stCxn id="58" idx="2"/>
-            <a:endCxn id="60" idx="3"/>
-          </p:cNvCxnSpPr>
-          <p:nvPr/>
-        </p:nvCxnSpPr>
-        <p:spPr>
-          <a:xfrm rot="5400000">
-            <a:off x="3440962" y="3236987"/>
-            <a:ext cx="565500" cy="1626900"/>
+          <a:xfrm flipH="1">
+            <a:off x="4374849" y="3696105"/>
+            <a:ext cx="1918200" cy="801600"/>
           </a:xfrm>
           <a:prstGeom prst="bentConnector2">
             <a:avLst/>
@@ -6571,20 +6630,18 @@
         <p:nvCxnSpPr>
           <p:cNvPr id="73" name="Google Shape;73;p13"/>
           <p:cNvCxnSpPr>
-            <a:stCxn id="59" idx="2"/>
-            <a:endCxn id="60" idx="2"/>
+            <a:stCxn id="58" idx="2"/>
+            <a:endCxn id="67" idx="0"/>
           </p:cNvCxnSpPr>
           <p:nvPr/>
         </p:nvCxnSpPr>
         <p:spPr>
-          <a:xfrm flipH="1" rot="5400000">
-            <a:off x="4551724" y="1761867"/>
-            <a:ext cx="12600" cy="5694600"/>
+          <a:xfrm flipH="1">
+            <a:off x="1784325" y="3459948"/>
+            <a:ext cx="2700" cy="351900"/>
           </a:xfrm>
-          <a:prstGeom prst="bentConnector3">
-            <a:avLst>
-              <a:gd fmla="val -1935976" name="adj1"/>
-            </a:avLst>
+          <a:prstGeom prst="straightConnector1">
+            <a:avLst/>
           </a:prstGeom>
           <a:noFill/>
           <a:ln cap="flat" cmpd="sng" w="9525">
@@ -6606,7 +6663,7 @@
         </p:nvSpPr>
         <p:spPr>
           <a:xfrm>
-            <a:off x="5982178" y="3156785"/>
+            <a:off x="3931103" y="1856385"/>
             <a:ext cx="1044900" cy="369300"/>
           </a:xfrm>
           <a:prstGeom prst="rect">
@@ -6635,29 +6692,88 @@
             <a:r>
               <a:rPr lang="fr" sz="1200">
                 <a:solidFill>
-                  <a:schemeClr val="dk2"/>
+                  <a:srgbClr val="595959"/>
                 </a:solidFill>
               </a:rPr>
-              <a:t>{id-tuteur }</a:t>
+              <a:t>{tuteur_id}</a:t>
             </a:r>
             <a:endParaRPr sz="1200">
               <a:solidFill>
-                <a:schemeClr val="dk2"/>
+                <a:srgbClr val="595959"/>
               </a:solidFill>
             </a:endParaRPr>
           </a:p>
         </p:txBody>
       </p:sp>
+      <p:cxnSp>
+        <p:nvCxnSpPr>
+          <p:cNvPr id="75" name="Google Shape;75;p13"/>
+          <p:cNvCxnSpPr>
+            <a:stCxn id="54" idx="3"/>
+            <a:endCxn id="64" idx="3"/>
+          </p:cNvCxnSpPr>
+          <p:nvPr/>
+        </p:nvCxnSpPr>
+        <p:spPr>
+          <a:xfrm>
+            <a:off x="7820348" y="1089908"/>
+            <a:ext cx="411900" cy="1112400"/>
+          </a:xfrm>
+          <a:prstGeom prst="bentConnector3">
+            <a:avLst>
+              <a:gd fmla="val 157811" name="adj1"/>
+            </a:avLst>
+          </a:prstGeom>
+          <a:noFill/>
+          <a:ln cap="flat" cmpd="sng" w="9525">
+            <a:solidFill>
+              <a:schemeClr val="dk2"/>
+            </a:solidFill>
+            <a:prstDash val="solid"/>
+            <a:round/>
+            <a:headEnd len="med" w="med" type="none"/>
+            <a:tailEnd len="med" w="med" type="triangle"/>
+          </a:ln>
+        </p:spPr>
+      </p:cxnSp>
+      <p:cxnSp>
+        <p:nvCxnSpPr>
+          <p:cNvPr id="76" name="Google Shape;76;p13"/>
+          <p:cNvCxnSpPr>
+            <a:endCxn id="57" idx="0"/>
+          </p:cNvCxnSpPr>
+          <p:nvPr/>
+        </p:nvCxnSpPr>
+        <p:spPr>
+          <a:xfrm>
+            <a:off x="7423599" y="2488155"/>
+            <a:ext cx="23700" cy="938100"/>
+          </a:xfrm>
+          <a:prstGeom prst="straightConnector1">
+            <a:avLst/>
+          </a:prstGeom>
+          <a:noFill/>
+          <a:ln cap="flat" cmpd="sng" w="9525">
+            <a:solidFill>
+              <a:schemeClr val="dk2"/>
+            </a:solidFill>
+            <a:prstDash val="solid"/>
+            <a:round/>
+            <a:headEnd len="med" w="med" type="none"/>
+            <a:tailEnd len="med" w="med" type="triangle"/>
+          </a:ln>
+        </p:spPr>
+      </p:cxnSp>
       <p:sp>
         <p:nvSpPr>
-          <p:cNvPr id="75" name="Google Shape;75;p13"/>
+          <p:cNvPr id="77" name="Google Shape;77;p13"/>
           <p:cNvSpPr txBox="1"/>
           <p:nvPr/>
         </p:nvSpPr>
         <p:spPr>
           <a:xfrm>
-            <a:off x="4726813" y="4008170"/>
-            <a:ext cx="1044900" cy="369300"/>
+            <a:off x="4686774" y="3613975"/>
+            <a:ext cx="1280400" cy="369300"/>
           </a:xfrm>
           <a:prstGeom prst="rect">
             <a:avLst/>
@@ -6685,14 +6801,109 @@
             <a:r>
               <a:rPr lang="fr" sz="1200">
                 <a:solidFill>
-                  <a:schemeClr val="dk2"/>
+                  <a:srgbClr val="595959"/>
                 </a:solidFill>
               </a:rPr>
-              <a:t>{id-tuteur }</a:t>
+              <a:t>{</a:t>
+            </a:r>
+            <a:r>
+              <a:rPr lang="fr" sz="1200">
+                <a:solidFill>
+                  <a:srgbClr val="595959"/>
+                </a:solidFill>
+              </a:rPr>
+              <a:t>bénéficiaireID</a:t>
+            </a:r>
+            <a:r>
+              <a:rPr lang="fr" sz="1200">
+                <a:solidFill>
+                  <a:srgbClr val="595959"/>
+                </a:solidFill>
+              </a:rPr>
+              <a:t>}</a:t>
             </a:r>
             <a:endParaRPr sz="1200">
               <a:solidFill>
-                <a:schemeClr val="dk2"/>
+                <a:srgbClr val="595959"/>
+              </a:solidFill>
+            </a:endParaRPr>
+          </a:p>
+        </p:txBody>
+      </p:sp>
+      <p:cxnSp>
+        <p:nvCxnSpPr>
+          <p:cNvPr id="78" name="Google Shape;78;p13"/>
+          <p:cNvCxnSpPr>
+            <a:stCxn id="67" idx="2"/>
+            <a:endCxn id="68" idx="1"/>
+          </p:cNvCxnSpPr>
+          <p:nvPr/>
+        </p:nvCxnSpPr>
+        <p:spPr>
+          <a:xfrm flipH="1" rot="-5400000">
+            <a:off x="2294499" y="3841267"/>
+            <a:ext cx="416100" cy="1436700"/>
+          </a:xfrm>
+          <a:prstGeom prst="bentConnector2">
+            <a:avLst/>
+          </a:prstGeom>
+          <a:noFill/>
+          <a:ln cap="flat" cmpd="sng" w="9525">
+            <a:solidFill>
+              <a:schemeClr val="dk2"/>
+            </a:solidFill>
+            <a:prstDash val="solid"/>
+            <a:round/>
+            <a:headEnd len="med" w="med" type="none"/>
+            <a:tailEnd len="med" w="med" type="triangle"/>
+          </a:ln>
+        </p:spPr>
+      </p:cxnSp>
+      <p:sp>
+        <p:nvSpPr>
+          <p:cNvPr id="79" name="Google Shape;79;p13"/>
+          <p:cNvSpPr txBox="1"/>
+          <p:nvPr/>
+        </p:nvSpPr>
+        <p:spPr>
+          <a:xfrm>
+            <a:off x="1791174" y="4452175"/>
+            <a:ext cx="1280400" cy="369300"/>
+          </a:xfrm>
+          <a:prstGeom prst="rect">
+            <a:avLst/>
+          </a:prstGeom>
+          <a:noFill/>
+          <a:ln>
+            <a:noFill/>
+          </a:ln>
+        </p:spPr>
+        <p:txBody>
+          <a:bodyPr anchorCtr="0" anchor="t" bIns="91425" lIns="91425" spcFirstLastPara="1" rIns="91425" wrap="square" tIns="91425">
+            <a:spAutoFit/>
+          </a:bodyPr>
+          <a:lstStyle/>
+          <a:p>
+            <a:pPr indent="0" lvl="0" marL="0" rtl="0" algn="l">
+              <a:spcBef>
+                <a:spcPts val="0"/>
+              </a:spcBef>
+              <a:spcAft>
+                <a:spcPts val="0"/>
+              </a:spcAft>
+              <a:buNone/>
+            </a:pPr>
+            <a:r>
+              <a:rPr lang="fr" sz="1200">
+                <a:solidFill>
+                  <a:srgbClr val="595959"/>
+                </a:solidFill>
+              </a:rPr>
+              <a:t>{bénéficiaireID}</a:t>
+            </a:r>
+            <a:endParaRPr sz="1200">
+              <a:solidFill>
+                <a:srgbClr val="595959"/>
               </a:solidFill>
             </a:endParaRPr>
           </a:p>

</xml_diff>